<commit_message>
changes in the explain_a_burst.files
</commit_message>
<xml_diff>
--- a/Report/explain_a_burst.pptx
+++ b/Report/explain_a_burst.pptx
@@ -6024,8 +6024,8 @@
                   </p:nvSpPr>
                   <p:spPr>
                     <a:xfrm>
-                      <a:off x="3851920" y="3429000"/>
-                      <a:ext cx="1000814" cy="1440160"/>
+                      <a:off x="3851921" y="3429000"/>
+                      <a:ext cx="864096" cy="1440160"/>
                     </a:xfrm>
                     <a:prstGeom prst="rect">
                       <a:avLst/>

</xml_diff>